<commit_message>
commit notebook and ppt
</commit_message>
<xml_diff>
--- a/HyperParameterTuning.pptx
+++ b/HyperParameterTuning.pptx
@@ -4,6 +4,9 @@
   <p:sldMasterIdLst>
     <p:sldMasterId id="2147483660" r:id="rId1"/>
   </p:sldMasterIdLst>
+  <p:notesMasterIdLst>
+    <p:notesMasterId r:id="rId13"/>
+  </p:notesMasterIdLst>
   <p:sldIdLst>
     <p:sldId id="256" r:id="rId2"/>
     <p:sldId id="260" r:id="rId3"/>
@@ -11,10 +14,11 @@
     <p:sldId id="261" r:id="rId5"/>
     <p:sldId id="262" r:id="rId6"/>
     <p:sldId id="263" r:id="rId7"/>
-    <p:sldId id="264" r:id="rId8"/>
-    <p:sldId id="265" r:id="rId9"/>
-    <p:sldId id="266" r:id="rId10"/>
-    <p:sldId id="267" r:id="rId11"/>
+    <p:sldId id="268" r:id="rId8"/>
+    <p:sldId id="270" r:id="rId9"/>
+    <p:sldId id="269" r:id="rId10"/>
+    <p:sldId id="271" r:id="rId11"/>
+    <p:sldId id="272" r:id="rId12"/>
   </p:sldIdLst>
   <p:sldSz cx="12192000" cy="6858000"/>
   <p:notesSz cx="6858000" cy="9144000"/>
@@ -124,10 +128,11 @@
             <p14:sldId id="261"/>
             <p14:sldId id="262"/>
             <p14:sldId id="263"/>
-            <p14:sldId id="264"/>
-            <p14:sldId id="265"/>
-            <p14:sldId id="266"/>
-            <p14:sldId id="267"/>
+            <p14:sldId id="268"/>
+            <p14:sldId id="270"/>
+            <p14:sldId id="269"/>
+            <p14:sldId id="271"/>
+            <p14:sldId id="272"/>
           </p14:sldIdLst>
         </p14:section>
       </p14:sectionLst>
@@ -137,6 +142,798 @@
     </p:ext>
   </p:extLst>
 </p:presentation>
+</file>
+
+<file path=ppt/notesMasters/notesMaster1.xml><?xml version="1.0" encoding="utf-8"?>
+<p:notesMaster xmlns:a="http://schemas.openxmlformats.org/drawingml/2006/main" xmlns:r="http://schemas.openxmlformats.org/officeDocument/2006/relationships" xmlns:p="http://schemas.openxmlformats.org/presentationml/2006/main">
+  <p:cSld>
+    <p:bg>
+      <p:bgRef idx="1001">
+        <a:schemeClr val="bg1"/>
+      </p:bgRef>
+    </p:bg>
+    <p:spTree>
+      <p:nvGrpSpPr>
+        <p:cNvPr id="1" name=""/>
+        <p:cNvGrpSpPr/>
+        <p:nvPr/>
+      </p:nvGrpSpPr>
+      <p:grpSpPr>
+        <a:xfrm>
+          <a:off x="0" y="0"/>
+          <a:ext cx="0" cy="0"/>
+          <a:chOff x="0" y="0"/>
+          <a:chExt cx="0" cy="0"/>
+        </a:xfrm>
+      </p:grpSpPr>
+      <p:sp>
+        <p:nvSpPr>
+          <p:cNvPr id="2" name="Header Placeholder 1"/>
+          <p:cNvSpPr>
+            <a:spLocks noGrp="1"/>
+          </p:cNvSpPr>
+          <p:nvPr>
+            <p:ph type="hdr" sz="quarter"/>
+          </p:nvPr>
+        </p:nvSpPr>
+        <p:spPr>
+          <a:xfrm>
+            <a:off x="0" y="0"/>
+            <a:ext cx="2971800" cy="458788"/>
+          </a:xfrm>
+          <a:prstGeom prst="rect">
+            <a:avLst/>
+          </a:prstGeom>
+        </p:spPr>
+        <p:txBody>
+          <a:bodyPr vert="horz" lIns="91440" tIns="45720" rIns="91440" bIns="45720" rtlCol="0"/>
+          <a:lstStyle>
+            <a:lvl1pPr algn="l">
+              <a:defRPr sz="1200"/>
+            </a:lvl1pPr>
+          </a:lstStyle>
+          <a:p>
+            <a:endParaRPr lang="en-US"/>
+          </a:p>
+        </p:txBody>
+      </p:sp>
+      <p:sp>
+        <p:nvSpPr>
+          <p:cNvPr id="3" name="Date Placeholder 2"/>
+          <p:cNvSpPr>
+            <a:spLocks noGrp="1"/>
+          </p:cNvSpPr>
+          <p:nvPr>
+            <p:ph type="dt" idx="1"/>
+          </p:nvPr>
+        </p:nvSpPr>
+        <p:spPr>
+          <a:xfrm>
+            <a:off x="3884613" y="0"/>
+            <a:ext cx="2971800" cy="458788"/>
+          </a:xfrm>
+          <a:prstGeom prst="rect">
+            <a:avLst/>
+          </a:prstGeom>
+        </p:spPr>
+        <p:txBody>
+          <a:bodyPr vert="horz" lIns="91440" tIns="45720" rIns="91440" bIns="45720" rtlCol="0"/>
+          <a:lstStyle>
+            <a:lvl1pPr algn="r">
+              <a:defRPr sz="1200"/>
+            </a:lvl1pPr>
+          </a:lstStyle>
+          <a:p>
+            <a:fld id="{3F9CB9D7-EF27-7741-8EF1-8BDB701F2380}" type="datetimeFigureOut">
+              <a:rPr lang="en-US" smtClean="0"/>
+              <a:t>11/6/19</a:t>
+            </a:fld>
+            <a:endParaRPr lang="en-US"/>
+          </a:p>
+        </p:txBody>
+      </p:sp>
+      <p:sp>
+        <p:nvSpPr>
+          <p:cNvPr id="4" name="Slide Image Placeholder 3"/>
+          <p:cNvSpPr>
+            <a:spLocks noGrp="1" noRot="1" noChangeAspect="1"/>
+          </p:cNvSpPr>
+          <p:nvPr>
+            <p:ph type="sldImg" idx="2"/>
+          </p:nvPr>
+        </p:nvSpPr>
+        <p:spPr>
+          <a:xfrm>
+            <a:off x="685800" y="1143000"/>
+            <a:ext cx="5486400" cy="3086100"/>
+          </a:xfrm>
+          <a:prstGeom prst="rect">
+            <a:avLst/>
+          </a:prstGeom>
+          <a:noFill/>
+          <a:ln w="12700">
+            <a:solidFill>
+              <a:prstClr val="black"/>
+            </a:solidFill>
+          </a:ln>
+        </p:spPr>
+        <p:txBody>
+          <a:bodyPr vert="horz" lIns="91440" tIns="45720" rIns="91440" bIns="45720" rtlCol="0" anchor="ctr"/>
+          <a:lstStyle/>
+          <a:p>
+            <a:endParaRPr lang="en-US"/>
+          </a:p>
+        </p:txBody>
+      </p:sp>
+      <p:sp>
+        <p:nvSpPr>
+          <p:cNvPr id="5" name="Notes Placeholder 4"/>
+          <p:cNvSpPr>
+            <a:spLocks noGrp="1"/>
+          </p:cNvSpPr>
+          <p:nvPr>
+            <p:ph type="body" sz="quarter" idx="3"/>
+          </p:nvPr>
+        </p:nvSpPr>
+        <p:spPr>
+          <a:xfrm>
+            <a:off x="685800" y="4400550"/>
+            <a:ext cx="5486400" cy="3600450"/>
+          </a:xfrm>
+          <a:prstGeom prst="rect">
+            <a:avLst/>
+          </a:prstGeom>
+        </p:spPr>
+        <p:txBody>
+          <a:bodyPr vert="horz" lIns="91440" tIns="45720" rIns="91440" bIns="45720" rtlCol="0"/>
+          <a:lstStyle/>
+          <a:p>
+            <a:pPr lvl="0"/>
+            <a:r>
+              <a:rPr lang="en-US"/>
+              <a:t>Click to edit Master text styles</a:t>
+            </a:r>
+          </a:p>
+          <a:p>
+            <a:pPr lvl="1"/>
+            <a:r>
+              <a:rPr lang="en-US"/>
+              <a:t>Second level</a:t>
+            </a:r>
+          </a:p>
+          <a:p>
+            <a:pPr lvl="2"/>
+            <a:r>
+              <a:rPr lang="en-US"/>
+              <a:t>Third level</a:t>
+            </a:r>
+          </a:p>
+          <a:p>
+            <a:pPr lvl="3"/>
+            <a:r>
+              <a:rPr lang="en-US"/>
+              <a:t>Fourth level</a:t>
+            </a:r>
+          </a:p>
+          <a:p>
+            <a:pPr lvl="4"/>
+            <a:r>
+              <a:rPr lang="en-US"/>
+              <a:t>Fifth level</a:t>
+            </a:r>
+          </a:p>
+        </p:txBody>
+      </p:sp>
+      <p:sp>
+        <p:nvSpPr>
+          <p:cNvPr id="6" name="Footer Placeholder 5"/>
+          <p:cNvSpPr>
+            <a:spLocks noGrp="1"/>
+          </p:cNvSpPr>
+          <p:nvPr>
+            <p:ph type="ftr" sz="quarter" idx="4"/>
+          </p:nvPr>
+        </p:nvSpPr>
+        <p:spPr>
+          <a:xfrm>
+            <a:off x="0" y="8685213"/>
+            <a:ext cx="2971800" cy="458787"/>
+          </a:xfrm>
+          <a:prstGeom prst="rect">
+            <a:avLst/>
+          </a:prstGeom>
+        </p:spPr>
+        <p:txBody>
+          <a:bodyPr vert="horz" lIns="91440" tIns="45720" rIns="91440" bIns="45720" rtlCol="0" anchor="b"/>
+          <a:lstStyle>
+            <a:lvl1pPr algn="l">
+              <a:defRPr sz="1200"/>
+            </a:lvl1pPr>
+          </a:lstStyle>
+          <a:p>
+            <a:endParaRPr lang="en-US"/>
+          </a:p>
+        </p:txBody>
+      </p:sp>
+      <p:sp>
+        <p:nvSpPr>
+          <p:cNvPr id="7" name="Slide Number Placeholder 6"/>
+          <p:cNvSpPr>
+            <a:spLocks noGrp="1"/>
+          </p:cNvSpPr>
+          <p:nvPr>
+            <p:ph type="sldNum" sz="quarter" idx="5"/>
+          </p:nvPr>
+        </p:nvSpPr>
+        <p:spPr>
+          <a:xfrm>
+            <a:off x="3884613" y="8685213"/>
+            <a:ext cx="2971800" cy="458787"/>
+          </a:xfrm>
+          <a:prstGeom prst="rect">
+            <a:avLst/>
+          </a:prstGeom>
+        </p:spPr>
+        <p:txBody>
+          <a:bodyPr vert="horz" lIns="91440" tIns="45720" rIns="91440" bIns="45720" rtlCol="0" anchor="b"/>
+          <a:lstStyle>
+            <a:lvl1pPr algn="r">
+              <a:defRPr sz="1200"/>
+            </a:lvl1pPr>
+          </a:lstStyle>
+          <a:p>
+            <a:fld id="{E1FD99F0-6AE0-184A-A40C-7E10F663504A}" type="slidenum">
+              <a:rPr lang="en-US" smtClean="0"/>
+              <a:t>‹#›</a:t>
+            </a:fld>
+            <a:endParaRPr lang="en-US"/>
+          </a:p>
+        </p:txBody>
+      </p:sp>
+    </p:spTree>
+    <p:extLst>
+      <p:ext uri="{BB962C8B-B14F-4D97-AF65-F5344CB8AC3E}">
+        <p14:creationId xmlns:p14="http://schemas.microsoft.com/office/powerpoint/2010/main" val="2928854377"/>
+      </p:ext>
+    </p:extLst>
+  </p:cSld>
+  <p:clrMap bg1="lt1" tx1="dk1" bg2="lt2" tx2="dk2" accent1="accent1" accent2="accent2" accent3="accent3" accent4="accent4" accent5="accent5" accent6="accent6" hlink="hlink" folHlink="folHlink"/>
+  <p:notesStyle>
+    <a:lvl1pPr marL="0" algn="l" defTabSz="914400" rtl="0" eaLnBrk="1" latinLnBrk="0" hangingPunct="1">
+      <a:defRPr sz="1200" kern="1200">
+        <a:solidFill>
+          <a:schemeClr val="tx1"/>
+        </a:solidFill>
+        <a:latin typeface="+mn-lt"/>
+        <a:ea typeface="+mn-ea"/>
+        <a:cs typeface="+mn-cs"/>
+      </a:defRPr>
+    </a:lvl1pPr>
+    <a:lvl2pPr marL="457200" algn="l" defTabSz="914400" rtl="0" eaLnBrk="1" latinLnBrk="0" hangingPunct="1">
+      <a:defRPr sz="1200" kern="1200">
+        <a:solidFill>
+          <a:schemeClr val="tx1"/>
+        </a:solidFill>
+        <a:latin typeface="+mn-lt"/>
+        <a:ea typeface="+mn-ea"/>
+        <a:cs typeface="+mn-cs"/>
+      </a:defRPr>
+    </a:lvl2pPr>
+    <a:lvl3pPr marL="914400" algn="l" defTabSz="914400" rtl="0" eaLnBrk="1" latinLnBrk="0" hangingPunct="1">
+      <a:defRPr sz="1200" kern="1200">
+        <a:solidFill>
+          <a:schemeClr val="tx1"/>
+        </a:solidFill>
+        <a:latin typeface="+mn-lt"/>
+        <a:ea typeface="+mn-ea"/>
+        <a:cs typeface="+mn-cs"/>
+      </a:defRPr>
+    </a:lvl3pPr>
+    <a:lvl4pPr marL="1371600" algn="l" defTabSz="914400" rtl="0" eaLnBrk="1" latinLnBrk="0" hangingPunct="1">
+      <a:defRPr sz="1200" kern="1200">
+        <a:solidFill>
+          <a:schemeClr val="tx1"/>
+        </a:solidFill>
+        <a:latin typeface="+mn-lt"/>
+        <a:ea typeface="+mn-ea"/>
+        <a:cs typeface="+mn-cs"/>
+      </a:defRPr>
+    </a:lvl4pPr>
+    <a:lvl5pPr marL="1828800" algn="l" defTabSz="914400" rtl="0" eaLnBrk="1" latinLnBrk="0" hangingPunct="1">
+      <a:defRPr sz="1200" kern="1200">
+        <a:solidFill>
+          <a:schemeClr val="tx1"/>
+        </a:solidFill>
+        <a:latin typeface="+mn-lt"/>
+        <a:ea typeface="+mn-ea"/>
+        <a:cs typeface="+mn-cs"/>
+      </a:defRPr>
+    </a:lvl5pPr>
+    <a:lvl6pPr marL="2286000" algn="l" defTabSz="914400" rtl="0" eaLnBrk="1" latinLnBrk="0" hangingPunct="1">
+      <a:defRPr sz="1200" kern="1200">
+        <a:solidFill>
+          <a:schemeClr val="tx1"/>
+        </a:solidFill>
+        <a:latin typeface="+mn-lt"/>
+        <a:ea typeface="+mn-ea"/>
+        <a:cs typeface="+mn-cs"/>
+      </a:defRPr>
+    </a:lvl6pPr>
+    <a:lvl7pPr marL="2743200" algn="l" defTabSz="914400" rtl="0" eaLnBrk="1" latinLnBrk="0" hangingPunct="1">
+      <a:defRPr sz="1200" kern="1200">
+        <a:solidFill>
+          <a:schemeClr val="tx1"/>
+        </a:solidFill>
+        <a:latin typeface="+mn-lt"/>
+        <a:ea typeface="+mn-ea"/>
+        <a:cs typeface="+mn-cs"/>
+      </a:defRPr>
+    </a:lvl7pPr>
+    <a:lvl8pPr marL="3200400" algn="l" defTabSz="914400" rtl="0" eaLnBrk="1" latinLnBrk="0" hangingPunct="1">
+      <a:defRPr sz="1200" kern="1200">
+        <a:solidFill>
+          <a:schemeClr val="tx1"/>
+        </a:solidFill>
+        <a:latin typeface="+mn-lt"/>
+        <a:ea typeface="+mn-ea"/>
+        <a:cs typeface="+mn-cs"/>
+      </a:defRPr>
+    </a:lvl8pPr>
+    <a:lvl9pPr marL="3657600" algn="l" defTabSz="914400" rtl="0" eaLnBrk="1" latinLnBrk="0" hangingPunct="1">
+      <a:defRPr sz="1200" kern="1200">
+        <a:solidFill>
+          <a:schemeClr val="tx1"/>
+        </a:solidFill>
+        <a:latin typeface="+mn-lt"/>
+        <a:ea typeface="+mn-ea"/>
+        <a:cs typeface="+mn-cs"/>
+      </a:defRPr>
+    </a:lvl9pPr>
+  </p:notesStyle>
+</p:notesMaster>
+</file>
+
+<file path=ppt/notesSlides/notesSlide1.xml><?xml version="1.0" encoding="utf-8"?>
+<p:notes xmlns:a="http://schemas.openxmlformats.org/drawingml/2006/main" xmlns:r="http://schemas.openxmlformats.org/officeDocument/2006/relationships" xmlns:p="http://schemas.openxmlformats.org/presentationml/2006/main">
+  <p:cSld>
+    <p:spTree>
+      <p:nvGrpSpPr>
+        <p:cNvPr id="1" name=""/>
+        <p:cNvGrpSpPr/>
+        <p:nvPr/>
+      </p:nvGrpSpPr>
+      <p:grpSpPr>
+        <a:xfrm>
+          <a:off x="0" y="0"/>
+          <a:ext cx="0" cy="0"/>
+          <a:chOff x="0" y="0"/>
+          <a:chExt cx="0" cy="0"/>
+        </a:xfrm>
+      </p:grpSpPr>
+      <p:sp>
+        <p:nvSpPr>
+          <p:cNvPr id="2" name="Slide Image Placeholder 1"/>
+          <p:cNvSpPr>
+            <a:spLocks noGrp="1" noRot="1" noChangeAspect="1"/>
+          </p:cNvSpPr>
+          <p:nvPr>
+            <p:ph type="sldImg"/>
+          </p:nvPr>
+        </p:nvSpPr>
+        <p:spPr/>
+      </p:sp>
+      <p:sp>
+        <p:nvSpPr>
+          <p:cNvPr id="3" name="Notes Placeholder 2"/>
+          <p:cNvSpPr>
+            <a:spLocks noGrp="1"/>
+          </p:cNvSpPr>
+          <p:nvPr>
+            <p:ph type="body" idx="1"/>
+          </p:nvPr>
+        </p:nvSpPr>
+        <p:spPr/>
+        <p:txBody>
+          <a:bodyPr/>
+          <a:lstStyle/>
+          <a:p>
+            <a:r>
+              <a:rPr lang="en-US" dirty="0"/>
+              <a:t>So the </a:t>
+            </a:r>
+            <a:r>
+              <a:rPr lang="en-US" dirty="0" err="1"/>
+              <a:t>algorthm</a:t>
+            </a:r>
+            <a:r>
+              <a:rPr lang="en-US" dirty="0"/>
+              <a:t> doesn’t waste computation time checking values near high error points.</a:t>
+            </a:r>
+          </a:p>
+        </p:txBody>
+      </p:sp>
+      <p:sp>
+        <p:nvSpPr>
+          <p:cNvPr id="4" name="Slide Number Placeholder 3"/>
+          <p:cNvSpPr>
+            <a:spLocks noGrp="1"/>
+          </p:cNvSpPr>
+          <p:nvPr>
+            <p:ph type="sldNum" sz="quarter" idx="5"/>
+          </p:nvPr>
+        </p:nvSpPr>
+        <p:spPr/>
+        <p:txBody>
+          <a:bodyPr/>
+          <a:lstStyle/>
+          <a:p>
+            <a:fld id="{E1FD99F0-6AE0-184A-A40C-7E10F663504A}" type="slidenum">
+              <a:rPr lang="en-US" smtClean="0"/>
+              <a:t>8</a:t>
+            </a:fld>
+            <a:endParaRPr lang="en-US"/>
+          </a:p>
+        </p:txBody>
+      </p:sp>
+    </p:spTree>
+    <p:extLst>
+      <p:ext uri="{BB962C8B-B14F-4D97-AF65-F5344CB8AC3E}">
+        <p14:creationId xmlns:p14="http://schemas.microsoft.com/office/powerpoint/2010/main" val="335520012"/>
+      </p:ext>
+    </p:extLst>
+  </p:cSld>
+  <p:clrMapOvr>
+    <a:masterClrMapping/>
+  </p:clrMapOvr>
+</p:notes>
+</file>
+
+<file path=ppt/notesSlides/notesSlide2.xml><?xml version="1.0" encoding="utf-8"?>
+<p:notes xmlns:a="http://schemas.openxmlformats.org/drawingml/2006/main" xmlns:r="http://schemas.openxmlformats.org/officeDocument/2006/relationships" xmlns:p="http://schemas.openxmlformats.org/presentationml/2006/main">
+  <p:cSld>
+    <p:spTree>
+      <p:nvGrpSpPr>
+        <p:cNvPr id="1" name=""/>
+        <p:cNvGrpSpPr/>
+        <p:nvPr/>
+      </p:nvGrpSpPr>
+      <p:grpSpPr>
+        <a:xfrm>
+          <a:off x="0" y="0"/>
+          <a:ext cx="0" cy="0"/>
+          <a:chOff x="0" y="0"/>
+          <a:chExt cx="0" cy="0"/>
+        </a:xfrm>
+      </p:grpSpPr>
+      <p:sp>
+        <p:nvSpPr>
+          <p:cNvPr id="2" name="Slide Image Placeholder 1"/>
+          <p:cNvSpPr>
+            <a:spLocks noGrp="1" noRot="1" noChangeAspect="1"/>
+          </p:cNvSpPr>
+          <p:nvPr>
+            <p:ph type="sldImg"/>
+          </p:nvPr>
+        </p:nvSpPr>
+        <p:spPr/>
+      </p:sp>
+      <p:sp>
+        <p:nvSpPr>
+          <p:cNvPr id="3" name="Notes Placeholder 2"/>
+          <p:cNvSpPr>
+            <a:spLocks noGrp="1"/>
+          </p:cNvSpPr>
+          <p:nvPr>
+            <p:ph type="body" idx="1"/>
+          </p:nvPr>
+        </p:nvSpPr>
+        <p:spPr/>
+        <p:txBody>
+          <a:bodyPr/>
+          <a:lstStyle/>
+          <a:p>
+            <a:r>
+              <a:rPr lang="en-US" sz="1200" b="0" i="0" kern="1200" dirty="0">
+                <a:solidFill>
+                  <a:schemeClr val="tx1"/>
+                </a:solidFill>
+                <a:effectLst/>
+                <a:latin typeface="+mn-lt"/>
+                <a:ea typeface="+mn-ea"/>
+                <a:cs typeface="+mn-cs"/>
+              </a:rPr>
+              <a:t>This shows an initial estimate of the surrogate model — in black with associated uncertainty in gray — after two evaluation</a:t>
+            </a:r>
+          </a:p>
+          <a:p>
+            <a:r>
+              <a:rPr lang="en-US" sz="1200" b="0" i="0" kern="1200" dirty="0">
+                <a:solidFill>
+                  <a:schemeClr val="tx1"/>
+                </a:solidFill>
+                <a:effectLst/>
+                <a:latin typeface="+mn-lt"/>
+                <a:ea typeface="+mn-ea"/>
+                <a:cs typeface="+mn-cs"/>
+              </a:rPr>
+              <a:t>s. Clearly, the surrogate model is a poor approximation of the actual objective function in red</a:t>
+            </a:r>
+            <a:endParaRPr lang="en-US" dirty="0"/>
+          </a:p>
+        </p:txBody>
+      </p:sp>
+      <p:sp>
+        <p:nvSpPr>
+          <p:cNvPr id="4" name="Slide Number Placeholder 3"/>
+          <p:cNvSpPr>
+            <a:spLocks noGrp="1"/>
+          </p:cNvSpPr>
+          <p:nvPr>
+            <p:ph type="sldNum" sz="quarter" idx="5"/>
+          </p:nvPr>
+        </p:nvSpPr>
+        <p:spPr/>
+        <p:txBody>
+          <a:bodyPr/>
+          <a:lstStyle/>
+          <a:p>
+            <a:fld id="{E1FD99F0-6AE0-184A-A40C-7E10F663504A}" type="slidenum">
+              <a:rPr lang="en-US" smtClean="0"/>
+              <a:t>9</a:t>
+            </a:fld>
+            <a:endParaRPr lang="en-US"/>
+          </a:p>
+        </p:txBody>
+      </p:sp>
+    </p:spTree>
+    <p:extLst>
+      <p:ext uri="{BB962C8B-B14F-4D97-AF65-F5344CB8AC3E}">
+        <p14:creationId xmlns:p14="http://schemas.microsoft.com/office/powerpoint/2010/main" val="1945306451"/>
+      </p:ext>
+    </p:extLst>
+  </p:cSld>
+  <p:clrMapOvr>
+    <a:masterClrMapping/>
+  </p:clrMapOvr>
+</p:notes>
+</file>
+
+<file path=ppt/notesSlides/notesSlide3.xml><?xml version="1.0" encoding="utf-8"?>
+<p:notes xmlns:a="http://schemas.openxmlformats.org/drawingml/2006/main" xmlns:r="http://schemas.openxmlformats.org/officeDocument/2006/relationships" xmlns:p="http://schemas.openxmlformats.org/presentationml/2006/main">
+  <p:cSld>
+    <p:spTree>
+      <p:nvGrpSpPr>
+        <p:cNvPr id="1" name=""/>
+        <p:cNvGrpSpPr/>
+        <p:nvPr/>
+      </p:nvGrpSpPr>
+      <p:grpSpPr>
+        <a:xfrm>
+          <a:off x="0" y="0"/>
+          <a:ext cx="0" cy="0"/>
+          <a:chOff x="0" y="0"/>
+          <a:chExt cx="0" cy="0"/>
+        </a:xfrm>
+      </p:grpSpPr>
+      <p:sp>
+        <p:nvSpPr>
+          <p:cNvPr id="2" name="Slide Image Placeholder 1"/>
+          <p:cNvSpPr>
+            <a:spLocks noGrp="1" noRot="1" noChangeAspect="1"/>
+          </p:cNvSpPr>
+          <p:nvPr>
+            <p:ph type="sldImg"/>
+          </p:nvPr>
+        </p:nvSpPr>
+        <p:spPr/>
+      </p:sp>
+      <p:sp>
+        <p:nvSpPr>
+          <p:cNvPr id="3" name="Notes Placeholder 2"/>
+          <p:cNvSpPr>
+            <a:spLocks noGrp="1"/>
+          </p:cNvSpPr>
+          <p:nvPr>
+            <p:ph type="body" idx="1"/>
+          </p:nvPr>
+        </p:nvSpPr>
+        <p:spPr/>
+        <p:txBody>
+          <a:bodyPr/>
+          <a:lstStyle/>
+          <a:p>
+            <a:pPr marL="0" marR="0" lvl="0" indent="0" algn="l" defTabSz="914400" rtl="0" eaLnBrk="1" fontAlgn="auto" latinLnBrk="0" hangingPunct="1">
+              <a:lnSpc>
+                <a:spcPct val="100000"/>
+              </a:lnSpc>
+              <a:spcBef>
+                <a:spcPts val="0"/>
+              </a:spcBef>
+              <a:spcAft>
+                <a:spcPts val="0"/>
+              </a:spcAft>
+              <a:buClrTx/>
+              <a:buSzTx/>
+              <a:buFontTx/>
+              <a:buNone/>
+              <a:tabLst/>
+              <a:defRPr/>
+            </a:pPr>
+            <a:r>
+              <a:rPr lang="en-US" sz="1200" b="0" i="0" kern="1200" dirty="0">
+                <a:solidFill>
+                  <a:schemeClr val="tx1"/>
+                </a:solidFill>
+                <a:effectLst/>
+                <a:latin typeface="+mn-lt"/>
+                <a:ea typeface="+mn-ea"/>
+                <a:cs typeface="+mn-cs"/>
+              </a:rPr>
+              <a:t>This image shows the surrogate function after 8 evaluations. Now the surrogate almost exactly matches the true function. Therefore, if the algorithm selects the hyperparameters that maximize the surrogate, they will likely yield very good results on the true evaluation function</a:t>
+            </a:r>
+            <a:endParaRPr lang="en-US" dirty="0"/>
+          </a:p>
+        </p:txBody>
+      </p:sp>
+      <p:sp>
+        <p:nvSpPr>
+          <p:cNvPr id="4" name="Slide Number Placeholder 3"/>
+          <p:cNvSpPr>
+            <a:spLocks noGrp="1"/>
+          </p:cNvSpPr>
+          <p:nvPr>
+            <p:ph type="sldNum" sz="quarter" idx="5"/>
+          </p:nvPr>
+        </p:nvSpPr>
+        <p:spPr/>
+        <p:txBody>
+          <a:bodyPr/>
+          <a:lstStyle/>
+          <a:p>
+            <a:fld id="{E1FD99F0-6AE0-184A-A40C-7E10F663504A}" type="slidenum">
+              <a:rPr lang="en-US" smtClean="0"/>
+              <a:t>10</a:t>
+            </a:fld>
+            <a:endParaRPr lang="en-US"/>
+          </a:p>
+        </p:txBody>
+      </p:sp>
+    </p:spTree>
+    <p:extLst>
+      <p:ext uri="{BB962C8B-B14F-4D97-AF65-F5344CB8AC3E}">
+        <p14:creationId xmlns:p14="http://schemas.microsoft.com/office/powerpoint/2010/main" val="1600275139"/>
+      </p:ext>
+    </p:extLst>
+  </p:cSld>
+  <p:clrMapOvr>
+    <a:masterClrMapping/>
+  </p:clrMapOvr>
+</p:notes>
+</file>
+
+<file path=ppt/notesSlides/notesSlide4.xml><?xml version="1.0" encoding="utf-8"?>
+<p:notes xmlns:a="http://schemas.openxmlformats.org/drawingml/2006/main" xmlns:r="http://schemas.openxmlformats.org/officeDocument/2006/relationships" xmlns:p="http://schemas.openxmlformats.org/presentationml/2006/main">
+  <p:cSld>
+    <p:spTree>
+      <p:nvGrpSpPr>
+        <p:cNvPr id="1" name=""/>
+        <p:cNvGrpSpPr/>
+        <p:nvPr/>
+      </p:nvGrpSpPr>
+      <p:grpSpPr>
+        <a:xfrm>
+          <a:off x="0" y="0"/>
+          <a:ext cx="0" cy="0"/>
+          <a:chOff x="0" y="0"/>
+          <a:chExt cx="0" cy="0"/>
+        </a:xfrm>
+      </p:grpSpPr>
+      <p:sp>
+        <p:nvSpPr>
+          <p:cNvPr id="2" name="Slide Image Placeholder 1"/>
+          <p:cNvSpPr>
+            <a:spLocks noGrp="1" noRot="1" noChangeAspect="1"/>
+          </p:cNvSpPr>
+          <p:nvPr>
+            <p:ph type="sldImg"/>
+          </p:nvPr>
+        </p:nvSpPr>
+        <p:spPr/>
+      </p:sp>
+      <p:sp>
+        <p:nvSpPr>
+          <p:cNvPr id="3" name="Notes Placeholder 2"/>
+          <p:cNvSpPr>
+            <a:spLocks noGrp="1"/>
+          </p:cNvSpPr>
+          <p:nvPr>
+            <p:ph type="body" idx="1"/>
+          </p:nvPr>
+        </p:nvSpPr>
+        <p:spPr/>
+        <p:txBody>
+          <a:bodyPr/>
+          <a:lstStyle/>
+          <a:p>
+            <a:pPr marL="0" marR="0" lvl="0" indent="0" algn="l" defTabSz="914400" rtl="0" eaLnBrk="1" fontAlgn="auto" latinLnBrk="0" hangingPunct="1">
+              <a:lnSpc>
+                <a:spcPct val="100000"/>
+              </a:lnSpc>
+              <a:spcBef>
+                <a:spcPts val="0"/>
+              </a:spcBef>
+              <a:spcAft>
+                <a:spcPts val="0"/>
+              </a:spcAft>
+              <a:buClrTx/>
+              <a:buSzTx/>
+              <a:buFontTx/>
+              <a:buNone/>
+              <a:tabLst/>
+              <a:defRPr/>
+            </a:pPr>
+            <a:r>
+              <a:rPr lang="en-US" sz="1200" b="0" i="0" kern="1200" dirty="0" err="1">
+                <a:solidFill>
+                  <a:schemeClr val="tx1"/>
+                </a:solidFill>
+                <a:effectLst/>
+                <a:latin typeface="+mn-lt"/>
+                <a:ea typeface="+mn-ea"/>
+                <a:cs typeface="+mn-cs"/>
+              </a:rPr>
+              <a:t>Thisimage</a:t>
+            </a:r>
+            <a:r>
+              <a:rPr lang="en-US" sz="1200" b="0" i="0" kern="1200" dirty="0">
+                <a:solidFill>
+                  <a:schemeClr val="tx1"/>
+                </a:solidFill>
+                <a:effectLst/>
+                <a:latin typeface="+mn-lt"/>
+                <a:ea typeface="+mn-ea"/>
+                <a:cs typeface="+mn-cs"/>
+              </a:rPr>
+              <a:t> shows the surrogate function after 8 evaluations. Now the surrogate almost exactly matches the true function. Therefore, if the algorithm selects the hyperparameters that maximize the surrogate, they will likely yield very good results on the true evaluation function</a:t>
+            </a:r>
+            <a:endParaRPr lang="en-US" dirty="0"/>
+          </a:p>
+        </p:txBody>
+      </p:sp>
+      <p:sp>
+        <p:nvSpPr>
+          <p:cNvPr id="4" name="Slide Number Placeholder 3"/>
+          <p:cNvSpPr>
+            <a:spLocks noGrp="1"/>
+          </p:cNvSpPr>
+          <p:nvPr>
+            <p:ph type="sldNum" sz="quarter" idx="5"/>
+          </p:nvPr>
+        </p:nvSpPr>
+        <p:spPr/>
+        <p:txBody>
+          <a:bodyPr/>
+          <a:lstStyle/>
+          <a:p>
+            <a:fld id="{E1FD99F0-6AE0-184A-A40C-7E10F663504A}" type="slidenum">
+              <a:rPr lang="en-US" smtClean="0"/>
+              <a:t>11</a:t>
+            </a:fld>
+            <a:endParaRPr lang="en-US"/>
+          </a:p>
+        </p:txBody>
+      </p:sp>
+    </p:spTree>
+    <p:extLst>
+      <p:ext uri="{BB962C8B-B14F-4D97-AF65-F5344CB8AC3E}">
+        <p14:creationId xmlns:p14="http://schemas.microsoft.com/office/powerpoint/2010/main" val="1346415555"/>
+      </p:ext>
+    </p:extLst>
+  </p:cSld>
+  <p:clrMapOvr>
+    <a:masterClrMapping/>
+  </p:clrMapOvr>
+</p:notes>
 </file>
 
 <file path=ppt/slideLayouts/slideLayout1.xml><?xml version="1.0" encoding="utf-8"?>
@@ -324,7 +1121,7 @@
           <a:p>
             <a:fld id="{88D38747-4367-4BD2-8D51-C97E202738E2}" type="datetime1">
               <a:rPr lang="en-US" smtClean="0"/>
-              <a:t>11/2/19</a:t>
+              <a:t>11/6/19</a:t>
             </a:fld>
             <a:endParaRPr lang="en-US" dirty="0"/>
           </a:p>
@@ -629,7 +1426,7 @@
           <a:p>
             <a:fld id="{11F1B079-7EF0-44EE-B798-BCC497C9F3B2}" type="datetime1">
               <a:rPr lang="en-US" smtClean="0"/>
-              <a:t>11/2/19</a:t>
+              <a:t>11/6/19</a:t>
             </a:fld>
             <a:endParaRPr lang="en-US" dirty="0"/>
           </a:p>
@@ -823,7 +1620,7 @@
           <a:p>
             <a:fld id="{28FF70A8-1D13-4657-95F0-A9EA54967B8D}" type="datetime1">
               <a:rPr lang="en-US" smtClean="0"/>
-              <a:t>11/2/19</a:t>
+              <a:t>11/6/19</a:t>
             </a:fld>
             <a:endParaRPr lang="en-US" dirty="0"/>
           </a:p>
@@ -1086,7 +1883,7 @@
           <a:p>
             <a:fld id="{21EB90AC-71BD-4C7F-8ACA-7B3F18292E63}" type="datetime1">
               <a:rPr lang="en-US" smtClean="0"/>
-              <a:t>11/2/19</a:t>
+              <a:t>11/6/19</a:t>
             </a:fld>
             <a:endParaRPr lang="en-US" dirty="0"/>
           </a:p>
@@ -1522,7 +2319,7 @@
           <a:p>
             <a:fld id="{4E6EFC2C-8905-46F0-B443-CE905B76BA01}" type="datetime1">
               <a:rPr lang="en-US" smtClean="0"/>
-              <a:t>11/2/19</a:t>
+              <a:t>11/6/19</a:t>
             </a:fld>
             <a:endParaRPr lang="en-US" dirty="0"/>
           </a:p>
@@ -2059,7 +2856,7 @@
           <a:p>
             <a:fld id="{D9079DC3-C9B5-499E-9140-0DC28B7074E2}" type="datetime1">
               <a:rPr lang="en-US" smtClean="0"/>
-              <a:t>11/2/19</a:t>
+              <a:t>11/6/19</a:t>
             </a:fld>
             <a:endParaRPr lang="en-US" dirty="0"/>
           </a:p>
@@ -2941,7 +3738,7 @@
           <a:p>
             <a:fld id="{30BB33EA-E472-4D22-9C03-A9C14AA21CED}" type="datetime1">
               <a:rPr lang="en-US" smtClean="0"/>
-              <a:t>11/2/19</a:t>
+              <a:t>11/6/19</a:t>
             </a:fld>
             <a:endParaRPr lang="en-US" dirty="0"/>
           </a:p>
@@ -3111,7 +3908,7 @@
           <a:p>
             <a:fld id="{217E833E-1B6D-415F-AD29-75AE8C43BD0D}" type="datetime1">
               <a:rPr lang="en-US" smtClean="0"/>
-              <a:t>11/2/19</a:t>
+              <a:t>11/6/19</a:t>
             </a:fld>
             <a:endParaRPr lang="en-US" dirty="0"/>
           </a:p>
@@ -3295,7 +4092,7 @@
           <a:p>
             <a:fld id="{8452596F-08A7-4B70-989A-F2B1CF31E66B}" type="datetime1">
               <a:rPr lang="en-US" smtClean="0"/>
-              <a:t>11/2/19</a:t>
+              <a:t>11/6/19</a:t>
             </a:fld>
             <a:endParaRPr lang="en-US" dirty="0"/>
           </a:p>
@@ -3465,7 +4262,7 @@
           <a:p>
             <a:fld id="{73C55A3C-5767-4844-A0A3-83778C2E5409}" type="datetime1">
               <a:rPr lang="en-US" smtClean="0"/>
-              <a:t>11/2/19</a:t>
+              <a:t>11/6/19</a:t>
             </a:fld>
             <a:endParaRPr lang="en-US" dirty="0"/>
           </a:p>
@@ -3709,7 +4506,7 @@
           <a:p>
             <a:fld id="{CAE507A8-A5CF-4D38-AB86-7EDDA87A85D4}" type="datetime1">
               <a:rPr lang="en-US" smtClean="0"/>
-              <a:t>11/2/19</a:t>
+              <a:t>11/6/19</a:t>
             </a:fld>
             <a:endParaRPr lang="en-US" dirty="0"/>
           </a:p>
@@ -3951,7 +4748,7 @@
           <a:p>
             <a:fld id="{BDFCD27C-8599-43EF-BA1D-14DDC1946E06}" type="datetime1">
               <a:rPr lang="en-US" smtClean="0"/>
-              <a:t>11/2/19</a:t>
+              <a:t>11/6/19</a:t>
             </a:fld>
             <a:endParaRPr lang="en-US" dirty="0"/>
           </a:p>
@@ -4432,7 +5229,7 @@
           <a:p>
             <a:fld id="{49343D99-809A-49C0-96E5-4250D0B498EE}" type="datetime1">
               <a:rPr lang="en-US" smtClean="0"/>
-              <a:t>11/2/19</a:t>
+              <a:t>11/6/19</a:t>
             </a:fld>
             <a:endParaRPr lang="en-US" dirty="0"/>
           </a:p>
@@ -4550,7 +5347,7 @@
           <a:p>
             <a:fld id="{A143DE9B-B678-4EFB-BB7D-A4370204A0B0}" type="datetime1">
               <a:rPr lang="en-US" smtClean="0"/>
-              <a:t>11/2/19</a:t>
+              <a:t>11/6/19</a:t>
             </a:fld>
             <a:endParaRPr lang="en-US" dirty="0"/>
           </a:p>
@@ -4645,7 +5442,7 @@
           <a:p>
             <a:fld id="{E68812DA-F765-4142-A6A3-A8ED7235E082}" type="datetime1">
               <a:rPr lang="en-US" smtClean="0"/>
-              <a:t>11/2/19</a:t>
+              <a:t>11/6/19</a:t>
             </a:fld>
             <a:endParaRPr lang="en-US" dirty="0"/>
           </a:p>
@@ -4900,7 +5697,7 @@
           <a:p>
             <a:fld id="{3E0277FD-7DE6-41D4-930D-AC99F5AFE54E}" type="datetime1">
               <a:rPr lang="en-US" smtClean="0"/>
-              <a:t>11/2/19</a:t>
+              <a:t>11/6/19</a:t>
             </a:fld>
             <a:endParaRPr lang="en-US" dirty="0"/>
           </a:p>
@@ -5207,7 +6004,7 @@
           <a:p>
             <a:fld id="{9EA15526-7079-4B7B-987C-1B5FAE11A0FF}" type="datetime1">
               <a:rPr lang="en-US" smtClean="0"/>
-              <a:t>11/2/19</a:t>
+              <a:t>11/6/19</a:t>
             </a:fld>
             <a:endParaRPr lang="en-US" dirty="0"/>
           </a:p>
@@ -5442,7 +6239,7 @@
           <a:p>
             <a:fld id="{073ED0CC-082F-4160-86E5-0D6041F12778}" type="datetime1">
               <a:rPr lang="en-US" smtClean="0"/>
-              <a:t>11/2/19</a:t>
+              <a:t>11/6/19</a:t>
             </a:fld>
             <a:endParaRPr lang="en-US" dirty="0"/>
           </a:p>
@@ -6163,7 +6960,7 @@
         </p:blipFill>
         <p:spPr>
           <a:xfrm>
-            <a:off x="20" y="10"/>
+            <a:off x="20" y="-10500"/>
             <a:ext cx="12191980" cy="6857990"/>
           </a:xfrm>
           <a:prstGeom prst="rect">
@@ -6419,7 +7216,7 @@
               <a:rPr lang="en-US" sz="4800" dirty="0">
                 <a:cs typeface="Arial" panose="020B0604020202020204" pitchFamily="34" charset="0"/>
               </a:rPr>
-              <a:t>Tuning</a:t>
+              <a:t>Optimization</a:t>
             </a:r>
           </a:p>
         </p:txBody>
@@ -6485,7 +7282,7 @@
             <a:pPr algn="l"/>
             <a:r>
               <a:rPr lang="en-US" sz="4400" b="1" dirty="0"/>
-              <a:t>Example 1</a:t>
+              <a:t>Bayes Optimization</a:t>
             </a:r>
           </a:p>
         </p:txBody>
@@ -6533,10 +7330,10 @@
       </p:cxnSp>
       <p:pic>
         <p:nvPicPr>
-          <p:cNvPr id="7" name="Picture 6" descr="A screenshot of a social media post&#10;&#10;Description automatically generated">
+          <p:cNvPr id="4" name="Picture 3" descr="A picture containing flying, kite, air, long&#10;&#10;Description automatically generated">
             <a:extLst>
               <a:ext uri="{FF2B5EF4-FFF2-40B4-BE49-F238E27FC236}">
-                <a16:creationId xmlns:a16="http://schemas.microsoft.com/office/drawing/2014/main" id="{42B10F57-1B97-C04B-9E23-ECEB445AF294}"/>
+                <a16:creationId xmlns:a16="http://schemas.microsoft.com/office/drawing/2014/main" id="{A2EA816B-E53D-FA4B-A528-2B7E8F6799E6}"/>
               </a:ext>
             </a:extLst>
           </p:cNvPr>
@@ -6546,15 +7343,15 @@
           <p:nvPr/>
         </p:nvPicPr>
         <p:blipFill>
-          <a:blip r:embed="rId2"/>
+          <a:blip r:embed="rId3"/>
           <a:stretch>
             <a:fillRect/>
           </a:stretch>
         </p:blipFill>
         <p:spPr>
           <a:xfrm>
-            <a:off x="901700" y="1980811"/>
-            <a:ext cx="10388600" cy="3759200"/>
+            <a:off x="1797050" y="2054554"/>
+            <a:ext cx="8597900" cy="4178300"/>
           </a:xfrm>
           <a:prstGeom prst="rect">
             <a:avLst/>
@@ -6564,7 +7361,236 @@
     </p:spTree>
     <p:extLst>
       <p:ext uri="{BB962C8B-B14F-4D97-AF65-F5344CB8AC3E}">
-        <p14:creationId xmlns:p14="http://schemas.microsoft.com/office/powerpoint/2010/main" val="775364768"/>
+        <p14:creationId xmlns:p14="http://schemas.microsoft.com/office/powerpoint/2010/main" val="3882578274"/>
+      </p:ext>
+    </p:extLst>
+  </p:cSld>
+  <p:clrMapOvr>
+    <a:masterClrMapping/>
+  </p:clrMapOvr>
+</p:sld>
+</file>
+
+<file path=ppt/slides/slide11.xml><?xml version="1.0" encoding="utf-8"?>
+<p:sld xmlns:a="http://schemas.openxmlformats.org/drawingml/2006/main" xmlns:r="http://schemas.openxmlformats.org/officeDocument/2006/relationships" xmlns:p="http://schemas.openxmlformats.org/presentationml/2006/main">
+  <p:cSld>
+    <p:spTree>
+      <p:nvGrpSpPr>
+        <p:cNvPr id="1" name=""/>
+        <p:cNvGrpSpPr/>
+        <p:nvPr/>
+      </p:nvGrpSpPr>
+      <p:grpSpPr>
+        <a:xfrm>
+          <a:off x="0" y="0"/>
+          <a:ext cx="0" cy="0"/>
+          <a:chOff x="0" y="0"/>
+          <a:chExt cx="0" cy="0"/>
+        </a:xfrm>
+      </p:grpSpPr>
+      <p:sp>
+        <p:nvSpPr>
+          <p:cNvPr id="2" name="Title 1">
+            <a:extLst>
+              <a:ext uri="{FF2B5EF4-FFF2-40B4-BE49-F238E27FC236}">
+                <a16:creationId xmlns:a16="http://schemas.microsoft.com/office/drawing/2014/main" id="{589C6AC7-B0DE-1D4F-AD45-7F6120553518}"/>
+              </a:ext>
+            </a:extLst>
+          </p:cNvPr>
+          <p:cNvSpPr>
+            <a:spLocks noGrp="1"/>
+          </p:cNvSpPr>
+          <p:nvPr>
+            <p:ph type="title"/>
+          </p:nvPr>
+        </p:nvSpPr>
+        <p:spPr>
+          <a:xfrm>
+            <a:off x="506023" y="152400"/>
+            <a:ext cx="10353762" cy="1257300"/>
+          </a:xfrm>
+        </p:spPr>
+        <p:txBody>
+          <a:bodyPr>
+            <a:normAutofit/>
+          </a:bodyPr>
+          <a:lstStyle/>
+          <a:p>
+            <a:pPr algn="l"/>
+            <a:r>
+              <a:rPr lang="en-US" sz="4400" b="1" dirty="0"/>
+              <a:t>Additional Resources</a:t>
+            </a:r>
+          </a:p>
+        </p:txBody>
+      </p:sp>
+      <p:cxnSp>
+        <p:nvCxnSpPr>
+          <p:cNvPr id="5" name="Straight Connector 4">
+            <a:extLst>
+              <a:ext uri="{FF2B5EF4-FFF2-40B4-BE49-F238E27FC236}">
+                <a16:creationId xmlns:a16="http://schemas.microsoft.com/office/drawing/2014/main" id="{85977B77-57A6-4B4A-A542-305ACDEE4918}"/>
+              </a:ext>
+            </a:extLst>
+          </p:cNvPr>
+          <p:cNvCxnSpPr/>
+          <p:nvPr/>
+        </p:nvCxnSpPr>
+        <p:spPr>
+          <a:xfrm>
+            <a:off x="0" y="1692166"/>
+            <a:ext cx="12192000" cy="0"/>
+          </a:xfrm>
+          <a:prstGeom prst="line">
+            <a:avLst/>
+          </a:prstGeom>
+          <a:ln w="44450">
+            <a:solidFill>
+              <a:srgbClr val="FF0000"/>
+            </a:solidFill>
+          </a:ln>
+        </p:spPr>
+        <p:style>
+          <a:lnRef idx="1">
+            <a:schemeClr val="accent1"/>
+          </a:lnRef>
+          <a:fillRef idx="0">
+            <a:schemeClr val="accent1"/>
+          </a:fillRef>
+          <a:effectRef idx="0">
+            <a:schemeClr val="accent1"/>
+          </a:effectRef>
+          <a:fontRef idx="minor">
+            <a:schemeClr val="tx1"/>
+          </a:fontRef>
+        </p:style>
+      </p:cxnSp>
+      <p:sp>
+        <p:nvSpPr>
+          <p:cNvPr id="6" name="Content Placeholder 2">
+            <a:extLst>
+              <a:ext uri="{FF2B5EF4-FFF2-40B4-BE49-F238E27FC236}">
+                <a16:creationId xmlns:a16="http://schemas.microsoft.com/office/drawing/2014/main" id="{DF74F171-8B8E-D341-9E72-E893062E90FA}"/>
+              </a:ext>
+            </a:extLst>
+          </p:cNvPr>
+          <p:cNvSpPr>
+            <a:spLocks noGrp="1"/>
+          </p:cNvSpPr>
+          <p:nvPr>
+            <p:ph idx="1"/>
+          </p:nvPr>
+        </p:nvSpPr>
+        <p:spPr>
+          <a:xfrm>
+            <a:off x="506023" y="1974633"/>
+            <a:ext cx="10353762" cy="3714749"/>
+          </a:xfrm>
+        </p:spPr>
+        <p:txBody>
+          <a:bodyPr>
+            <a:normAutofit fontScale="25000" lnSpcReduction="20000"/>
+          </a:bodyPr>
+          <a:lstStyle/>
+          <a:p>
+            <a:r>
+              <a:rPr lang="en-US" sz="11200" dirty="0">
+                <a:solidFill>
+                  <a:srgbClr val="00B0F0"/>
+                </a:solidFill>
+                <a:hlinkClick r:id="rId3">
+                  <a:extLst>
+                    <a:ext uri="{A12FA001-AC4F-418D-AE19-62706E023703}">
+                      <ahyp:hlinkClr xmlns:ahyp="http://schemas.microsoft.com/office/drawing/2018/hyperlinkcolor" val="tx"/>
+                    </a:ext>
+                  </a:extLst>
+                </a:hlinkClick>
+              </a:rPr>
+              <a:t>https://towardsdatascience.com/a-conceptual-explanation-of-bayesian-model-based-hyperparameter-optimization-for-machine-learning-b8172278050f</a:t>
+            </a:r>
+            <a:endParaRPr lang="en-US" sz="11200" dirty="0">
+              <a:solidFill>
+                <a:srgbClr val="00B0F0"/>
+              </a:solidFill>
+            </a:endParaRPr>
+          </a:p>
+          <a:p>
+            <a:r>
+              <a:rPr lang="en-US" sz="11200" dirty="0">
+                <a:solidFill>
+                  <a:srgbClr val="00B0F0"/>
+                </a:solidFill>
+                <a:hlinkClick r:id="rId4">
+                  <a:extLst>
+                    <a:ext uri="{A12FA001-AC4F-418D-AE19-62706E023703}">
+                      <ahyp:hlinkClr xmlns:ahyp="http://schemas.microsoft.com/office/drawing/2018/hyperlinkcolor" val="tx"/>
+                    </a:ext>
+                  </a:extLst>
+                </a:hlinkClick>
+              </a:rPr>
+              <a:t>https://towardsdatascience.com/automated-machine-learning-hyperparameter-tuning-in-python-dfda59b72f8a</a:t>
+            </a:r>
+            <a:endParaRPr lang="en-US" sz="11200" dirty="0">
+              <a:solidFill>
+                <a:srgbClr val="00B0F0"/>
+              </a:solidFill>
+            </a:endParaRPr>
+          </a:p>
+          <a:p>
+            <a:r>
+              <a:rPr lang="en-US" sz="11200" dirty="0">
+                <a:solidFill>
+                  <a:srgbClr val="00B0F0"/>
+                </a:solidFill>
+                <a:hlinkClick r:id="rId5">
+                  <a:extLst>
+                    <a:ext uri="{A12FA001-AC4F-418D-AE19-62706E023703}">
+                      <ahyp:hlinkClr xmlns:ahyp="http://schemas.microsoft.com/office/drawing/2018/hyperlinkcolor" val="tx"/>
+                    </a:ext>
+                  </a:extLst>
+                </a:hlinkClick>
+              </a:rPr>
+              <a:t>https://towardsdatascience.com/an-introductory-example-of-bayesian-optimization-in-python-with-hyperopt-aae40fff4ff0</a:t>
+            </a:r>
+            <a:endParaRPr lang="en-US" sz="11200" dirty="0">
+              <a:solidFill>
+                <a:srgbClr val="00B0F0"/>
+              </a:solidFill>
+              <a:cs typeface="Arial" panose="020B0604020202020204" pitchFamily="34" charset="0"/>
+            </a:endParaRPr>
+          </a:p>
+          <a:p>
+            <a:endParaRPr lang="en-US" sz="11200" dirty="0">
+              <a:cs typeface="Arial" panose="020B0604020202020204" pitchFamily="34" charset="0"/>
+            </a:endParaRPr>
+          </a:p>
+          <a:p>
+            <a:endParaRPr lang="en-US" sz="2800" dirty="0"/>
+          </a:p>
+          <a:p>
+            <a:endParaRPr lang="en-US" sz="2800" dirty="0"/>
+          </a:p>
+          <a:p>
+            <a:pPr marL="36900" indent="0">
+              <a:buNone/>
+            </a:pPr>
+            <a:r>
+              <a:rPr lang="en-US" sz="2800" dirty="0"/>
+              <a:t>	</a:t>
+            </a:r>
+          </a:p>
+          <a:p>
+            <a:pPr marL="36900" indent="0">
+              <a:buNone/>
+            </a:pPr>
+            <a:endParaRPr lang="en-US" sz="2800" dirty="0"/>
+          </a:p>
+        </p:txBody>
+      </p:sp>
+    </p:spTree>
+    <p:extLst>
+      <p:ext uri="{BB962C8B-B14F-4D97-AF65-F5344CB8AC3E}">
+        <p14:creationId xmlns:p14="http://schemas.microsoft.com/office/powerpoint/2010/main" val="1171840905"/>
       </p:ext>
     </p:extLst>
   </p:cSld>
@@ -6651,12 +7677,14 @@
         </p:spPr>
         <p:txBody>
           <a:bodyPr>
-            <a:normAutofit fontScale="77500" lnSpcReduction="20000"/>
+            <a:normAutofit fontScale="25000" lnSpcReduction="20000"/>
           </a:bodyPr>
           <a:lstStyle/>
           <a:p>
             <a:r>
-              <a:rPr lang="en-US" sz="3300" dirty="0"/>
+              <a:rPr lang="en-US" sz="11200" dirty="0">
+                <a:cs typeface="Arial" panose="020B0604020202020204" pitchFamily="34" charset="0"/>
+              </a:rPr>
               <a:t>Manual Searching</a:t>
             </a:r>
           </a:p>
@@ -6665,23 +7693,47 @@
               <a:buNone/>
             </a:pPr>
             <a:r>
-              <a:rPr lang="en-US" sz="3300" dirty="0"/>
+              <a:rPr lang="en-US" sz="11200" dirty="0">
+                <a:cs typeface="Arial" panose="020B0604020202020204" pitchFamily="34" charset="0"/>
+              </a:rPr>
               <a:t>	</a:t>
             </a:r>
           </a:p>
           <a:p>
             <a:r>
-              <a:rPr lang="en-US" sz="3300" dirty="0"/>
+              <a:rPr lang="en-US" sz="11200" dirty="0">
+                <a:cs typeface="Arial" panose="020B0604020202020204" pitchFamily="34" charset="0"/>
+              </a:rPr>
               <a:t>RandomizedSearchCV</a:t>
             </a:r>
           </a:p>
           <a:p>
-            <a:endParaRPr lang="en-US" sz="3300" dirty="0"/>
-          </a:p>
-          <a:p>
-            <a:r>
-              <a:rPr lang="en-US" sz="3300" dirty="0"/>
+            <a:endParaRPr lang="en-US" sz="11200" dirty="0">
+              <a:cs typeface="Arial" panose="020B0604020202020204" pitchFamily="34" charset="0"/>
+            </a:endParaRPr>
+          </a:p>
+          <a:p>
+            <a:r>
+              <a:rPr lang="en-US" sz="11200" dirty="0" err="1">
+                <a:cs typeface="Arial" panose="020B0604020202020204" pitchFamily="34" charset="0"/>
+              </a:rPr>
               <a:t>GridSearchCV</a:t>
+            </a:r>
+            <a:endParaRPr lang="en-US" sz="11200" dirty="0">
+              <a:cs typeface="Arial" panose="020B0604020202020204" pitchFamily="34" charset="0"/>
+            </a:endParaRPr>
+          </a:p>
+          <a:p>
+            <a:endParaRPr lang="en-US" sz="11200" dirty="0">
+              <a:cs typeface="Arial" panose="020B0604020202020204" pitchFamily="34" charset="0"/>
+            </a:endParaRPr>
+          </a:p>
+          <a:p>
+            <a:r>
+              <a:rPr lang="en-US" sz="11200" dirty="0">
+                <a:cs typeface="Arial" panose="020B0604020202020204" pitchFamily="34" charset="0"/>
+              </a:rPr>
+              <a:t>Bayesian Optimization</a:t>
             </a:r>
           </a:p>
           <a:p>
@@ -10659,6 +11711,12 @@
               <a:t>More parameter possibilities greatly increases duration</a:t>
             </a:r>
           </a:p>
+          <a:p>
+            <a:r>
+              <a:rPr lang="en-US" sz="2800" dirty="0"/>
+              <a:t>High computation cost</a:t>
+            </a:r>
+          </a:p>
         </p:txBody>
       </p:sp>
     </p:spTree>
@@ -10722,7 +11780,7 @@
             <a:pPr algn="l"/>
             <a:r>
               <a:rPr lang="en-US" sz="4400" b="1" dirty="0"/>
-              <a:t>Example 1</a:t>
+              <a:t>Bayesian Optimization</a:t>
             </a:r>
           </a:p>
         </p:txBody>
@@ -10768,70 +11826,97 @@
           </a:fontRef>
         </p:style>
       </p:cxnSp>
-      <p:pic>
-        <p:nvPicPr>
-          <p:cNvPr id="8" name="Picture 7" descr="A screenshot of a cell phone&#10;&#10;Description automatically generated">
+      <p:sp>
+        <p:nvSpPr>
+          <p:cNvPr id="6" name="Content Placeholder 2">
             <a:extLst>
               <a:ext uri="{FF2B5EF4-FFF2-40B4-BE49-F238E27FC236}">
-                <a16:creationId xmlns:a16="http://schemas.microsoft.com/office/drawing/2014/main" id="{03B3F5D3-E655-4642-BE0B-F4171ECA7A6B}"/>
+                <a16:creationId xmlns:a16="http://schemas.microsoft.com/office/drawing/2014/main" id="{4DB1E43D-CA44-1D42-B3EE-39C8B32A759E}"/>
               </a:ext>
             </a:extLst>
           </p:cNvPr>
-          <p:cNvPicPr>
-            <a:picLocks noChangeAspect="1"/>
-          </p:cNvPicPr>
-          <p:nvPr/>
-        </p:nvPicPr>
-        <p:blipFill>
-          <a:blip r:embed="rId2"/>
-          <a:stretch>
-            <a:fillRect/>
-          </a:stretch>
-        </p:blipFill>
-        <p:spPr>
-          <a:xfrm>
-            <a:off x="901700" y="1974633"/>
-            <a:ext cx="10363200" cy="2527300"/>
-          </a:xfrm>
-          <a:prstGeom prst="rect">
-            <a:avLst/>
-          </a:prstGeom>
-        </p:spPr>
-      </p:pic>
-      <p:pic>
-        <p:nvPicPr>
-          <p:cNvPr id="10" name="Picture 9" descr="A screenshot of a cell phone&#10;&#10;Description automatically generated">
-            <a:extLst>
-              <a:ext uri="{FF2B5EF4-FFF2-40B4-BE49-F238E27FC236}">
-                <a16:creationId xmlns:a16="http://schemas.microsoft.com/office/drawing/2014/main" id="{A15FD513-554B-0B43-9F0A-0844FCF91988}"/>
-              </a:ext>
-            </a:extLst>
-          </p:cNvPr>
-          <p:cNvPicPr>
-            <a:picLocks noChangeAspect="1"/>
-          </p:cNvPicPr>
-          <p:nvPr/>
-        </p:nvPicPr>
-        <p:blipFill>
-          <a:blip r:embed="rId3"/>
-          <a:stretch>
-            <a:fillRect/>
-          </a:stretch>
-        </p:blipFill>
-        <p:spPr>
-          <a:xfrm>
-            <a:off x="901700" y="4527356"/>
-            <a:ext cx="10337800" cy="1968500"/>
-          </a:xfrm>
-          <a:prstGeom prst="rect">
-            <a:avLst/>
-          </a:prstGeom>
-        </p:spPr>
-      </p:pic>
+          <p:cNvSpPr>
+            <a:spLocks noGrp="1"/>
+          </p:cNvSpPr>
+          <p:nvPr>
+            <p:ph idx="1"/>
+          </p:nvPr>
+        </p:nvSpPr>
+        <p:spPr>
+          <a:xfrm>
+            <a:off x="506023" y="1974633"/>
+            <a:ext cx="10353762" cy="3714749"/>
+          </a:xfrm>
+        </p:spPr>
+        <p:txBody>
+          <a:bodyPr>
+            <a:normAutofit fontScale="25000" lnSpcReduction="20000"/>
+          </a:bodyPr>
+          <a:lstStyle/>
+          <a:p>
+            <a:r>
+              <a:rPr lang="en-US" sz="11200" dirty="0">
+                <a:cs typeface="Arial" panose="020B0604020202020204" pitchFamily="34" charset="0"/>
+              </a:rPr>
+              <a:t>Used if computation cost is high</a:t>
+            </a:r>
+          </a:p>
+          <a:p>
+            <a:pPr marL="36900" indent="0">
+              <a:buNone/>
+            </a:pPr>
+            <a:r>
+              <a:rPr lang="en-US" sz="11200" dirty="0">
+                <a:cs typeface="Arial" panose="020B0604020202020204" pitchFamily="34" charset="0"/>
+              </a:rPr>
+              <a:t>	</a:t>
+            </a:r>
+          </a:p>
+          <a:p>
+            <a:r>
+              <a:rPr lang="en-US" sz="11200" dirty="0">
+                <a:effectLst/>
+              </a:rPr>
+              <a:t>limit expensive evaluations of the objective function by choosing the next input values based on those that have done well in the past.</a:t>
+            </a:r>
+          </a:p>
+          <a:p>
+            <a:endParaRPr lang="en-US" sz="7000" dirty="0">
+              <a:cs typeface="Arial" panose="020B0604020202020204" pitchFamily="34" charset="0"/>
+            </a:endParaRPr>
+          </a:p>
+          <a:p>
+            <a:endParaRPr lang="en-US" sz="11200" dirty="0">
+              <a:cs typeface="Arial" panose="020B0604020202020204" pitchFamily="34" charset="0"/>
+            </a:endParaRPr>
+          </a:p>
+          <a:p>
+            <a:endParaRPr lang="en-US" sz="2800" dirty="0"/>
+          </a:p>
+          <a:p>
+            <a:endParaRPr lang="en-US" sz="2800" dirty="0"/>
+          </a:p>
+          <a:p>
+            <a:pPr marL="36900" indent="0">
+              <a:buNone/>
+            </a:pPr>
+            <a:r>
+              <a:rPr lang="en-US" sz="2800" dirty="0"/>
+              <a:t>	</a:t>
+            </a:r>
+          </a:p>
+          <a:p>
+            <a:pPr marL="36900" indent="0">
+              <a:buNone/>
+            </a:pPr>
+            <a:endParaRPr lang="en-US" sz="2800" dirty="0"/>
+          </a:p>
+        </p:txBody>
+      </p:sp>
     </p:spTree>
     <p:extLst>
       <p:ext uri="{BB962C8B-B14F-4D97-AF65-F5344CB8AC3E}">
-        <p14:creationId xmlns:p14="http://schemas.microsoft.com/office/powerpoint/2010/main" val="770228266"/>
+        <p14:creationId xmlns:p14="http://schemas.microsoft.com/office/powerpoint/2010/main" val="3066082724"/>
       </p:ext>
     </p:extLst>
   </p:cSld>
@@ -10889,7 +11974,7 @@
             <a:pPr algn="l"/>
             <a:r>
               <a:rPr lang="en-US" sz="4400" b="1" dirty="0"/>
-              <a:t>Example 1</a:t>
+              <a:t>Bayesian Optimization</a:t>
             </a:r>
           </a:p>
         </p:txBody>
@@ -10937,10 +12022,10 @@
       </p:cxnSp>
       <p:pic>
         <p:nvPicPr>
-          <p:cNvPr id="13" name="Picture 12" descr="A screenshot of a cell phone&#10;&#10;Description automatically generated">
+          <p:cNvPr id="8" name="Picture 7" descr="A close up of a white background&#10;&#10;Description automatically generated">
             <a:extLst>
               <a:ext uri="{FF2B5EF4-FFF2-40B4-BE49-F238E27FC236}">
-                <a16:creationId xmlns:a16="http://schemas.microsoft.com/office/drawing/2014/main" id="{F7E94650-B50C-DF47-B8D8-CBC8F5072D91}"/>
+                <a16:creationId xmlns:a16="http://schemas.microsoft.com/office/drawing/2014/main" id="{92C85A44-33B8-8A48-BE26-0BF8508D3E6D}"/>
               </a:ext>
             </a:extLst>
           </p:cNvPr>
@@ -10950,25 +12035,78 @@
           <p:nvPr/>
         </p:nvPicPr>
         <p:blipFill>
-          <a:blip r:embed="rId2"/>
+          <a:blip r:embed="rId3"/>
           <a:stretch>
             <a:fillRect/>
           </a:stretch>
         </p:blipFill>
         <p:spPr>
           <a:xfrm>
-            <a:off x="927100" y="1974633"/>
-            <a:ext cx="10337800" cy="3683000"/>
+            <a:off x="6642537" y="1974633"/>
+            <a:ext cx="5258085" cy="4038134"/>
           </a:xfrm>
           <a:prstGeom prst="rect">
             <a:avLst/>
           </a:prstGeom>
         </p:spPr>
       </p:pic>
+      <p:sp>
+        <p:nvSpPr>
+          <p:cNvPr id="9" name="Content Placeholder 2">
+            <a:extLst>
+              <a:ext uri="{FF2B5EF4-FFF2-40B4-BE49-F238E27FC236}">
+                <a16:creationId xmlns:a16="http://schemas.microsoft.com/office/drawing/2014/main" id="{BD3805D5-CB3C-3F41-9A0E-C0AB66AD839D}"/>
+              </a:ext>
+            </a:extLst>
+          </p:cNvPr>
+          <p:cNvSpPr>
+            <a:spLocks noGrp="1"/>
+          </p:cNvSpPr>
+          <p:nvPr>
+            <p:ph idx="1"/>
+          </p:nvPr>
+        </p:nvSpPr>
+        <p:spPr>
+          <a:xfrm>
+            <a:off x="506023" y="1974633"/>
+            <a:ext cx="5716101" cy="3714749"/>
+          </a:xfrm>
+        </p:spPr>
+        <p:txBody>
+          <a:bodyPr>
+            <a:normAutofit/>
+          </a:bodyPr>
+          <a:lstStyle/>
+          <a:p>
+            <a:r>
+              <a:rPr lang="en-US" sz="2800" dirty="0"/>
+              <a:t>Concentrates search where error is lower </a:t>
+            </a:r>
+          </a:p>
+          <a:p>
+            <a:r>
+              <a:rPr lang="en-US" sz="2800" dirty="0"/>
+              <a:t>Creates surrogate function</a:t>
+            </a:r>
+          </a:p>
+          <a:p>
+            <a:r>
+              <a:rPr lang="en-US" sz="2800" dirty="0"/>
+              <a:t>Surrogate model is much cheaper to compute</a:t>
+            </a:r>
+          </a:p>
+          <a:p>
+            <a:pPr marL="36900" indent="0">
+              <a:buNone/>
+            </a:pPr>
+            <a:endParaRPr lang="en-US" sz="2800" dirty="0"/>
+          </a:p>
+        </p:txBody>
+      </p:sp>
     </p:spTree>
     <p:extLst>
       <p:ext uri="{BB962C8B-B14F-4D97-AF65-F5344CB8AC3E}">
-        <p14:creationId xmlns:p14="http://schemas.microsoft.com/office/powerpoint/2010/main" val="2816799105"/>
+        <p14:creationId xmlns:p14="http://schemas.microsoft.com/office/powerpoint/2010/main" val="1479385"/>
       </p:ext>
     </p:extLst>
   </p:cSld>
@@ -11026,7 +12164,7 @@
             <a:pPr algn="l"/>
             <a:r>
               <a:rPr lang="en-US" sz="4400" b="1" dirty="0"/>
-              <a:t>Example 1</a:t>
+              <a:t>Bayes Optimization</a:t>
             </a:r>
           </a:p>
         </p:txBody>
@@ -11074,40 +12212,10 @@
       </p:cxnSp>
       <p:pic>
         <p:nvPicPr>
-          <p:cNvPr id="4" name="Picture 3" descr="A screenshot of a cell phone&#10;&#10;Description automatically generated">
+          <p:cNvPr id="8" name="Picture 7">
             <a:extLst>
               <a:ext uri="{FF2B5EF4-FFF2-40B4-BE49-F238E27FC236}">
-                <a16:creationId xmlns:a16="http://schemas.microsoft.com/office/drawing/2014/main" id="{9D5E2A53-A870-6B48-AF4E-4446A14F4CB8}"/>
-              </a:ext>
-            </a:extLst>
-          </p:cNvPr>
-          <p:cNvPicPr>
-            <a:picLocks noChangeAspect="1"/>
-          </p:cNvPicPr>
-          <p:nvPr/>
-        </p:nvPicPr>
-        <p:blipFill>
-          <a:blip r:embed="rId2"/>
-          <a:stretch>
-            <a:fillRect/>
-          </a:stretch>
-        </p:blipFill>
-        <p:spPr>
-          <a:xfrm>
-            <a:off x="920750" y="1974633"/>
-            <a:ext cx="10350500" cy="2324100"/>
-          </a:xfrm>
-          <a:prstGeom prst="rect">
-            <a:avLst/>
-          </a:prstGeom>
-        </p:spPr>
-      </p:pic>
-      <p:pic>
-        <p:nvPicPr>
-          <p:cNvPr id="7" name="Picture 6" descr="A screenshot of a cell phone&#10;&#10;Description automatically generated">
-            <a:extLst>
-              <a:ext uri="{FF2B5EF4-FFF2-40B4-BE49-F238E27FC236}">
-                <a16:creationId xmlns:a16="http://schemas.microsoft.com/office/drawing/2014/main" id="{ADA535C4-5F47-EE4A-B239-77182E66ED5F}"/>
+                <a16:creationId xmlns:a16="http://schemas.microsoft.com/office/drawing/2014/main" id="{42266EDB-00A4-2D44-BD93-E42FA423DD5C}"/>
               </a:ext>
             </a:extLst>
           </p:cNvPr>
@@ -11124,8 +12232,8 @@
         </p:blipFill>
         <p:spPr>
           <a:xfrm>
-            <a:off x="920750" y="4395848"/>
-            <a:ext cx="10299700" cy="1968500"/>
+            <a:off x="1771650" y="2100754"/>
+            <a:ext cx="8648700" cy="4191000"/>
           </a:xfrm>
           <a:prstGeom prst="rect">
             <a:avLst/>
@@ -11135,7 +12243,7 @@
     </p:spTree>
     <p:extLst>
       <p:ext uri="{BB962C8B-B14F-4D97-AF65-F5344CB8AC3E}">
-        <p14:creationId xmlns:p14="http://schemas.microsoft.com/office/powerpoint/2010/main" val="700806573"/>
+        <p14:creationId xmlns:p14="http://schemas.microsoft.com/office/powerpoint/2010/main" val="2034706781"/>
       </p:ext>
     </p:extLst>
   </p:cSld>
@@ -11385,4 +12493,299 @@
     </a:ext>
   </a:extLst>
 </a:theme>
+</file>
+
+<file path=ppt/theme/theme2.xml><?xml version="1.0" encoding="utf-8"?>
+<a:theme xmlns:a="http://schemas.openxmlformats.org/drawingml/2006/main" name="Office Theme">
+  <a:themeElements>
+    <a:clrScheme name="Office">
+      <a:dk1>
+        <a:sysClr val="windowText" lastClr="000000"/>
+      </a:dk1>
+      <a:lt1>
+        <a:sysClr val="window" lastClr="FFFFFF"/>
+      </a:lt1>
+      <a:dk2>
+        <a:srgbClr val="44546A"/>
+      </a:dk2>
+      <a:lt2>
+        <a:srgbClr val="E7E6E6"/>
+      </a:lt2>
+      <a:accent1>
+        <a:srgbClr val="4472C4"/>
+      </a:accent1>
+      <a:accent2>
+        <a:srgbClr val="ED7D31"/>
+      </a:accent2>
+      <a:accent3>
+        <a:srgbClr val="A5A5A5"/>
+      </a:accent3>
+      <a:accent4>
+        <a:srgbClr val="FFC000"/>
+      </a:accent4>
+      <a:accent5>
+        <a:srgbClr val="5B9BD5"/>
+      </a:accent5>
+      <a:accent6>
+        <a:srgbClr val="70AD47"/>
+      </a:accent6>
+      <a:hlink>
+        <a:srgbClr val="0563C1"/>
+      </a:hlink>
+      <a:folHlink>
+        <a:srgbClr val="954F72"/>
+      </a:folHlink>
+    </a:clrScheme>
+    <a:fontScheme name="Office">
+      <a:majorFont>
+        <a:latin typeface="Calibri Light" panose="020F0302020204030204"/>
+        <a:ea typeface=""/>
+        <a:cs typeface=""/>
+        <a:font script="Jpan" typeface="游ゴシック Light"/>
+        <a:font script="Hang" typeface="맑은 고딕"/>
+        <a:font script="Hans" typeface="等线 Light"/>
+        <a:font script="Hant" typeface="新細明體"/>
+        <a:font script="Arab" typeface="Times New Roman"/>
+        <a:font script="Hebr" typeface="Times New Roman"/>
+        <a:font script="Thai" typeface="Angsana New"/>
+        <a:font script="Ethi" typeface="Nyala"/>
+        <a:font script="Beng" typeface="Vrinda"/>
+        <a:font script="Gujr" typeface="Shruti"/>
+        <a:font script="Khmr" typeface="MoolBoran"/>
+        <a:font script="Knda" typeface="Tunga"/>
+        <a:font script="Guru" typeface="Raavi"/>
+        <a:font script="Cans" typeface="Euphemia"/>
+        <a:font script="Cher" typeface="Plantagenet Cherokee"/>
+        <a:font script="Yiii" typeface="Microsoft Yi Baiti"/>
+        <a:font script="Tibt" typeface="Microsoft Himalaya"/>
+        <a:font script="Thaa" typeface="MV Boli"/>
+        <a:font script="Deva" typeface="Mangal"/>
+        <a:font script="Telu" typeface="Gautami"/>
+        <a:font script="Taml" typeface="Latha"/>
+        <a:font script="Syrc" typeface="Estrangelo Edessa"/>
+        <a:font script="Orya" typeface="Kalinga"/>
+        <a:font script="Mlym" typeface="Kartika"/>
+        <a:font script="Laoo" typeface="DokChampa"/>
+        <a:font script="Sinh" typeface="Iskoola Pota"/>
+        <a:font script="Mong" typeface="Mongolian Baiti"/>
+        <a:font script="Viet" typeface="Times New Roman"/>
+        <a:font script="Uigh" typeface="Microsoft Uighur"/>
+        <a:font script="Geor" typeface="Sylfaen"/>
+        <a:font script="Armn" typeface="Arial"/>
+        <a:font script="Bugi" typeface="Leelawadee UI"/>
+        <a:font script="Bopo" typeface="Microsoft JhengHei"/>
+        <a:font script="Java" typeface="Javanese Text"/>
+        <a:font script="Lisu" typeface="Segoe UI"/>
+        <a:font script="Mymr" typeface="Myanmar Text"/>
+        <a:font script="Nkoo" typeface="Ebrima"/>
+        <a:font script="Olck" typeface="Nirmala UI"/>
+        <a:font script="Osma" typeface="Ebrima"/>
+        <a:font script="Phag" typeface="Phagspa"/>
+        <a:font script="Syrn" typeface="Estrangelo Edessa"/>
+        <a:font script="Syrj" typeface="Estrangelo Edessa"/>
+        <a:font script="Syre" typeface="Estrangelo Edessa"/>
+        <a:font script="Sora" typeface="Nirmala UI"/>
+        <a:font script="Tale" typeface="Microsoft Tai Le"/>
+        <a:font script="Talu" typeface="Microsoft New Tai Lue"/>
+        <a:font script="Tfng" typeface="Ebrima"/>
+      </a:majorFont>
+      <a:minorFont>
+        <a:latin typeface="Calibri" panose="020F0502020204030204"/>
+        <a:ea typeface=""/>
+        <a:cs typeface=""/>
+        <a:font script="Jpan" typeface="游ゴシック"/>
+        <a:font script="Hang" typeface="맑은 고딕"/>
+        <a:font script="Hans" typeface="等线"/>
+        <a:font script="Hant" typeface="新細明體"/>
+        <a:font script="Arab" typeface="Arial"/>
+        <a:font script="Hebr" typeface="Arial"/>
+        <a:font script="Thai" typeface="Cordia New"/>
+        <a:font script="Ethi" typeface="Nyala"/>
+        <a:font script="Beng" typeface="Vrinda"/>
+        <a:font script="Gujr" typeface="Shruti"/>
+        <a:font script="Khmr" typeface="DaunPenh"/>
+        <a:font script="Knda" typeface="Tunga"/>
+        <a:font script="Guru" typeface="Raavi"/>
+        <a:font script="Cans" typeface="Euphemia"/>
+        <a:font script="Cher" typeface="Plantagenet Cherokee"/>
+        <a:font script="Yiii" typeface="Microsoft Yi Baiti"/>
+        <a:font script="Tibt" typeface="Microsoft Himalaya"/>
+        <a:font script="Thaa" typeface="MV Boli"/>
+        <a:font script="Deva" typeface="Mangal"/>
+        <a:font script="Telu" typeface="Gautami"/>
+        <a:font script="Taml" typeface="Latha"/>
+        <a:font script="Syrc" typeface="Estrangelo Edessa"/>
+        <a:font script="Orya" typeface="Kalinga"/>
+        <a:font script="Mlym" typeface="Kartika"/>
+        <a:font script="Laoo" typeface="DokChampa"/>
+        <a:font script="Sinh" typeface="Iskoola Pota"/>
+        <a:font script="Mong" typeface="Mongolian Baiti"/>
+        <a:font script="Viet" typeface="Arial"/>
+        <a:font script="Uigh" typeface="Microsoft Uighur"/>
+        <a:font script="Geor" typeface="Sylfaen"/>
+        <a:font script="Armn" typeface="Arial"/>
+        <a:font script="Bugi" typeface="Leelawadee UI"/>
+        <a:font script="Bopo" typeface="Microsoft JhengHei"/>
+        <a:font script="Java" typeface="Javanese Text"/>
+        <a:font script="Lisu" typeface="Segoe UI"/>
+        <a:font script="Mymr" typeface="Myanmar Text"/>
+        <a:font script="Nkoo" typeface="Ebrima"/>
+        <a:font script="Olck" typeface="Nirmala UI"/>
+        <a:font script="Osma" typeface="Ebrima"/>
+        <a:font script="Phag" typeface="Phagspa"/>
+        <a:font script="Syrn" typeface="Estrangelo Edessa"/>
+        <a:font script="Syrj" typeface="Estrangelo Edessa"/>
+        <a:font script="Syre" typeface="Estrangelo Edessa"/>
+        <a:font script="Sora" typeface="Nirmala UI"/>
+        <a:font script="Tale" typeface="Microsoft Tai Le"/>
+        <a:font script="Talu" typeface="Microsoft New Tai Lue"/>
+        <a:font script="Tfng" typeface="Ebrima"/>
+      </a:minorFont>
+    </a:fontScheme>
+    <a:fmtScheme name="Office">
+      <a:fillStyleLst>
+        <a:solidFill>
+          <a:schemeClr val="phClr"/>
+        </a:solidFill>
+        <a:gradFill rotWithShape="1">
+          <a:gsLst>
+            <a:gs pos="0">
+              <a:schemeClr val="phClr">
+                <a:lumMod val="110000"/>
+                <a:satMod val="105000"/>
+                <a:tint val="67000"/>
+              </a:schemeClr>
+            </a:gs>
+            <a:gs pos="50000">
+              <a:schemeClr val="phClr">
+                <a:lumMod val="105000"/>
+                <a:satMod val="103000"/>
+                <a:tint val="73000"/>
+              </a:schemeClr>
+            </a:gs>
+            <a:gs pos="100000">
+              <a:schemeClr val="phClr">
+                <a:lumMod val="105000"/>
+                <a:satMod val="109000"/>
+                <a:tint val="81000"/>
+              </a:schemeClr>
+            </a:gs>
+          </a:gsLst>
+          <a:lin ang="5400000" scaled="0"/>
+        </a:gradFill>
+        <a:gradFill rotWithShape="1">
+          <a:gsLst>
+            <a:gs pos="0">
+              <a:schemeClr val="phClr">
+                <a:satMod val="103000"/>
+                <a:lumMod val="102000"/>
+                <a:tint val="94000"/>
+              </a:schemeClr>
+            </a:gs>
+            <a:gs pos="50000">
+              <a:schemeClr val="phClr">
+                <a:satMod val="110000"/>
+                <a:lumMod val="100000"/>
+                <a:shade val="100000"/>
+              </a:schemeClr>
+            </a:gs>
+            <a:gs pos="100000">
+              <a:schemeClr val="phClr">
+                <a:lumMod val="99000"/>
+                <a:satMod val="120000"/>
+                <a:shade val="78000"/>
+              </a:schemeClr>
+            </a:gs>
+          </a:gsLst>
+          <a:lin ang="5400000" scaled="0"/>
+        </a:gradFill>
+      </a:fillStyleLst>
+      <a:lnStyleLst>
+        <a:ln w="6350" cap="flat" cmpd="sng" algn="ctr">
+          <a:solidFill>
+            <a:schemeClr val="phClr"/>
+          </a:solidFill>
+          <a:prstDash val="solid"/>
+          <a:miter lim="800000"/>
+        </a:ln>
+        <a:ln w="12700" cap="flat" cmpd="sng" algn="ctr">
+          <a:solidFill>
+            <a:schemeClr val="phClr"/>
+          </a:solidFill>
+          <a:prstDash val="solid"/>
+          <a:miter lim="800000"/>
+        </a:ln>
+        <a:ln w="19050" cap="flat" cmpd="sng" algn="ctr">
+          <a:solidFill>
+            <a:schemeClr val="phClr"/>
+          </a:solidFill>
+          <a:prstDash val="solid"/>
+          <a:miter lim="800000"/>
+        </a:ln>
+      </a:lnStyleLst>
+      <a:effectStyleLst>
+        <a:effectStyle>
+          <a:effectLst/>
+        </a:effectStyle>
+        <a:effectStyle>
+          <a:effectLst/>
+        </a:effectStyle>
+        <a:effectStyle>
+          <a:effectLst>
+            <a:outerShdw blurRad="57150" dist="19050" dir="5400000" algn="ctr" rotWithShape="0">
+              <a:srgbClr val="000000">
+                <a:alpha val="63000"/>
+              </a:srgbClr>
+            </a:outerShdw>
+          </a:effectLst>
+        </a:effectStyle>
+      </a:effectStyleLst>
+      <a:bgFillStyleLst>
+        <a:solidFill>
+          <a:schemeClr val="phClr"/>
+        </a:solidFill>
+        <a:solidFill>
+          <a:schemeClr val="phClr">
+            <a:tint val="95000"/>
+            <a:satMod val="170000"/>
+          </a:schemeClr>
+        </a:solidFill>
+        <a:gradFill rotWithShape="1">
+          <a:gsLst>
+            <a:gs pos="0">
+              <a:schemeClr val="phClr">
+                <a:tint val="93000"/>
+                <a:satMod val="150000"/>
+                <a:shade val="98000"/>
+                <a:lumMod val="102000"/>
+              </a:schemeClr>
+            </a:gs>
+            <a:gs pos="50000">
+              <a:schemeClr val="phClr">
+                <a:tint val="98000"/>
+                <a:satMod val="130000"/>
+                <a:shade val="90000"/>
+                <a:lumMod val="103000"/>
+              </a:schemeClr>
+            </a:gs>
+            <a:gs pos="100000">
+              <a:schemeClr val="phClr">
+                <a:shade val="63000"/>
+                <a:satMod val="120000"/>
+              </a:schemeClr>
+            </a:gs>
+          </a:gsLst>
+          <a:lin ang="5400000" scaled="0"/>
+        </a:gradFill>
+      </a:bgFillStyleLst>
+    </a:fmtScheme>
+  </a:themeElements>
+  <a:objectDefaults/>
+  <a:extraClrSchemeLst/>
+  <a:extLst>
+    <a:ext uri="{05A4C25C-085E-4340-85A3-A5531E510DB2}">
+      <thm15:themeFamily xmlns:thm15="http://schemas.microsoft.com/office/thememl/2012/main" name="Office Theme" id="{62F939B6-93AF-4DB8-9C6B-D6C7DFDC589F}" vid="{4A3C46E8-61CC-4603-A589-7422A47A8E4A}"/>
+    </a:ext>
+  </a:extLst>
+</a:theme>
 </file>
</xml_diff>